<commit_message>
Updated power point for presentation
</commit_message>
<xml_diff>
--- a/CS 6330 Final Project.pptx
+++ b/CS 6330 Final Project.pptx
@@ -5,13 +5,15 @@
     <p:sldMasterId id="2147483690" r:id="rId4"/>
   </p:sldMasterIdLst>
   <p:notesMasterIdLst>
-    <p:notesMasterId r:id="rId9"/>
+    <p:notesMasterId r:id="rId11"/>
   </p:notesMasterIdLst>
   <p:sldIdLst>
     <p:sldId id="259" r:id="rId5"/>
     <p:sldId id="258" r:id="rId6"/>
-    <p:sldId id="256" r:id="rId7"/>
-    <p:sldId id="257" r:id="rId8"/>
+    <p:sldId id="260" r:id="rId7"/>
+    <p:sldId id="261" r:id="rId8"/>
+    <p:sldId id="256" r:id="rId9"/>
+    <p:sldId id="257" r:id="rId10"/>
   </p:sldIdLst>
   <p:sldSz cx="9144000" cy="6858000" type="screen4x3"/>
   <p:notesSz cx="6858000" cy="9144000"/>
@@ -17637,7 +17639,10 @@
           <a:bodyPr/>
           <a:lstStyle/>
           <a:p>
-            <a:endParaRPr lang="en-US"/>
+            <a:r>
+              <a:rPr lang="en-US" dirty="0"/>
+              <a:t>Problem Statement</a:t>
+            </a:r>
           </a:p>
         </p:txBody>
       </p:sp>
@@ -17662,7 +17667,10 @@
           <a:bodyPr/>
           <a:lstStyle/>
           <a:p>
-            <a:endParaRPr lang="en-US"/>
+            <a:r>
+              <a:rPr lang="en-US" dirty="0"/>
+              <a:t>CS 6330 Final Project</a:t>
+            </a:r>
           </a:p>
         </p:txBody>
       </p:sp>
@@ -17687,7 +17695,91 @@
           <a:bodyPr/>
           <a:lstStyle/>
           <a:p>
-            <a:endParaRPr lang="en-US"/>
+            <a:r>
+              <a:rPr lang="en-US" dirty="0"/>
+              <a:t>The Goal of this project was to collect time series data from an IMU, and use it to identify individuals and activities</a:t>
+            </a:r>
+          </a:p>
+          <a:p>
+            <a:endParaRPr lang="en-US" dirty="0"/>
+          </a:p>
+          <a:p>
+            <a:pPr lvl="1"/>
+            <a:r>
+              <a:rPr lang="en-US" dirty="0"/>
+              <a:t>Gait is the cyclic movement of the body during locomotion</a:t>
+            </a:r>
+          </a:p>
+          <a:p>
+            <a:pPr lvl="1"/>
+            <a:r>
+              <a:rPr lang="en-US" dirty="0"/>
+              <a:t>Gait can be broken down into the Stance phase and Swing phase</a:t>
+            </a:r>
+          </a:p>
+          <a:p>
+            <a:pPr lvl="2"/>
+            <a:r>
+              <a:rPr lang="en-US" dirty="0"/>
+              <a:t>Stance Phase			Stance Phase</a:t>
+            </a:r>
+          </a:p>
+          <a:p>
+            <a:pPr lvl="3"/>
+            <a:r>
+              <a:rPr lang="en-US" dirty="0"/>
+              <a:t>Heel Strike				Acceleration Phase</a:t>
+            </a:r>
+          </a:p>
+          <a:p>
+            <a:pPr lvl="3"/>
+            <a:r>
+              <a:rPr lang="en-US" dirty="0"/>
+              <a:t>Foot Loading				Mid-Swing</a:t>
+            </a:r>
+          </a:p>
+          <a:p>
+            <a:pPr lvl="3"/>
+            <a:r>
+              <a:rPr lang="en-US" dirty="0"/>
+              <a:t>Midstance shift			Deceleration Phase</a:t>
+            </a:r>
+          </a:p>
+          <a:p>
+            <a:pPr lvl="3"/>
+            <a:r>
+              <a:rPr lang="en-US" dirty="0"/>
+              <a:t>Heel-off</a:t>
+            </a:r>
+          </a:p>
+          <a:p>
+            <a:pPr lvl="3"/>
+            <a:r>
+              <a:rPr lang="en-US" dirty="0"/>
+              <a:t>Toe-off</a:t>
+            </a:r>
+          </a:p>
+          <a:p>
+            <a:pPr lvl="1"/>
+            <a:r>
+              <a:rPr lang="en-US" dirty="0"/>
+              <a:t>Movement is highly individualized and unique to each person</a:t>
+            </a:r>
+          </a:p>
+          <a:p>
+            <a:pPr lvl="1"/>
+            <a:r>
+              <a:rPr lang="en-US" dirty="0"/>
+              <a:t>Typical tools consist of stop motion photography, pressure sensors, and accelerometers strapped to the body. </a:t>
+            </a:r>
+          </a:p>
+          <a:p>
+            <a:pPr lvl="1"/>
+            <a:endParaRPr lang="en-US" dirty="0"/>
+          </a:p>
+          <a:p>
+            <a:pPr lvl="1"/>
+            <a:endParaRPr lang="en-US" dirty="0"/>
           </a:p>
         </p:txBody>
       </p:sp>
@@ -17797,6 +17889,578 @@
       </p:grpSpPr>
       <p:sp>
         <p:nvSpPr>
+          <p:cNvPr id="2" name="Text Placeholder 1">
+            <a:extLst>
+              <a:ext uri="{FF2B5EF4-FFF2-40B4-BE49-F238E27FC236}">
+                <a16:creationId xmlns:a16="http://schemas.microsoft.com/office/drawing/2014/main" id="{A674C37A-3004-4323-A15B-215ECF4C5F86}"/>
+              </a:ext>
+            </a:extLst>
+          </p:cNvPr>
+          <p:cNvSpPr>
+            <a:spLocks noGrp="1"/>
+          </p:cNvSpPr>
+          <p:nvPr>
+            <p:ph type="body" sz="quarter" idx="10"/>
+          </p:nvPr>
+        </p:nvSpPr>
+        <p:spPr/>
+        <p:txBody>
+          <a:bodyPr/>
+          <a:lstStyle/>
+          <a:p>
+            <a:r>
+              <a:rPr lang="en-US" dirty="0"/>
+              <a:t>Methodology</a:t>
+            </a:r>
+          </a:p>
+        </p:txBody>
+      </p:sp>
+      <p:sp>
+        <p:nvSpPr>
+          <p:cNvPr id="3" name="Title 2">
+            <a:extLst>
+              <a:ext uri="{FF2B5EF4-FFF2-40B4-BE49-F238E27FC236}">
+                <a16:creationId xmlns:a16="http://schemas.microsoft.com/office/drawing/2014/main" id="{3CA30697-0A05-4204-9367-0131791CC3C5}"/>
+              </a:ext>
+            </a:extLst>
+          </p:cNvPr>
+          <p:cNvSpPr>
+            <a:spLocks noGrp="1"/>
+          </p:cNvSpPr>
+          <p:nvPr>
+            <p:ph type="title"/>
+          </p:nvPr>
+        </p:nvSpPr>
+        <p:spPr/>
+        <p:txBody>
+          <a:bodyPr/>
+          <a:lstStyle/>
+          <a:p>
+            <a:r>
+              <a:rPr lang="en-US" dirty="0"/>
+              <a:t>CS 6330 Final Project</a:t>
+            </a:r>
+          </a:p>
+        </p:txBody>
+      </p:sp>
+      <p:sp>
+        <p:nvSpPr>
+          <p:cNvPr id="4" name="Content Placeholder 3">
+            <a:extLst>
+              <a:ext uri="{FF2B5EF4-FFF2-40B4-BE49-F238E27FC236}">
+                <a16:creationId xmlns:a16="http://schemas.microsoft.com/office/drawing/2014/main" id="{34F16E64-213B-470D-9BEC-78E4B1A0B61D}"/>
+              </a:ext>
+            </a:extLst>
+          </p:cNvPr>
+          <p:cNvSpPr>
+            <a:spLocks noGrp="1"/>
+          </p:cNvSpPr>
+          <p:nvPr>
+            <p:ph idx="1"/>
+          </p:nvPr>
+        </p:nvSpPr>
+        <p:spPr/>
+        <p:txBody>
+          <a:bodyPr/>
+          <a:lstStyle/>
+          <a:p>
+            <a:r>
+              <a:rPr lang="en-US" dirty="0"/>
+              <a:t>Data Collection</a:t>
+            </a:r>
+          </a:p>
+          <a:p>
+            <a:pPr lvl="1"/>
+            <a:r>
+              <a:rPr lang="en-US" dirty="0"/>
+              <a:t>Three test subjects were outfitted with a 6 axis IMU, which recorded angular velocity and acceleration</a:t>
+            </a:r>
+          </a:p>
+          <a:p>
+            <a:pPr lvl="2"/>
+            <a:r>
+              <a:rPr lang="en-US" dirty="0"/>
+              <a:t>Data was collected at 500 </a:t>
+            </a:r>
+            <a:r>
+              <a:rPr lang="en-US" dirty="0" err="1"/>
+              <a:t>hz</a:t>
+            </a:r>
+            <a:r>
+              <a:rPr lang="en-US" dirty="0"/>
+              <a:t> and then down sampled to 100 </a:t>
+            </a:r>
+            <a:r>
+              <a:rPr lang="en-US" dirty="0" err="1"/>
+              <a:t>hz</a:t>
+            </a:r>
+            <a:endParaRPr lang="en-US" dirty="0"/>
+          </a:p>
+          <a:p>
+            <a:pPr lvl="2"/>
+            <a:r>
+              <a:rPr lang="en-US" dirty="0"/>
+              <a:t>The sensor was mounted at the hip</a:t>
+            </a:r>
+          </a:p>
+          <a:p>
+            <a:pPr lvl="2"/>
+            <a:endParaRPr lang="en-US" dirty="0"/>
+          </a:p>
+          <a:p>
+            <a:pPr lvl="1"/>
+            <a:r>
+              <a:rPr lang="en-US" dirty="0"/>
+              <a:t>The recorded activities included</a:t>
+            </a:r>
+          </a:p>
+          <a:p>
+            <a:pPr lvl="2"/>
+            <a:r>
+              <a:rPr lang="en-US" dirty="0"/>
+              <a:t>Walking at a measured pace</a:t>
+            </a:r>
+          </a:p>
+          <a:p>
+            <a:pPr lvl="2"/>
+            <a:r>
+              <a:rPr lang="en-US" dirty="0"/>
+              <a:t>Running </a:t>
+            </a:r>
+          </a:p>
+          <a:p>
+            <a:pPr lvl="2"/>
+            <a:r>
+              <a:rPr lang="en-US" dirty="0"/>
+              <a:t>Stair climbing/descending</a:t>
+            </a:r>
+          </a:p>
+          <a:p>
+            <a:pPr lvl="2"/>
+            <a:r>
+              <a:rPr lang="en-US" dirty="0"/>
+              <a:t>Treadmill</a:t>
+            </a:r>
+          </a:p>
+          <a:p>
+            <a:pPr lvl="2"/>
+            <a:r>
+              <a:rPr lang="en-US" dirty="0"/>
+              <a:t>Sitting</a:t>
+            </a:r>
+          </a:p>
+          <a:p>
+            <a:pPr lvl="2"/>
+            <a:r>
+              <a:rPr lang="en-US" dirty="0"/>
+              <a:t>Jumping</a:t>
+            </a:r>
+          </a:p>
+          <a:p>
+            <a:pPr lvl="2"/>
+            <a:r>
+              <a:rPr lang="en-US" dirty="0"/>
+              <a:t>Standing</a:t>
+            </a:r>
+          </a:p>
+          <a:p>
+            <a:pPr lvl="1"/>
+            <a:endParaRPr lang="en-US" dirty="0"/>
+          </a:p>
+        </p:txBody>
+      </p:sp>
+      <p:sp>
+        <p:nvSpPr>
+          <p:cNvPr id="5" name="Slide Number Placeholder 4">
+            <a:extLst>
+              <a:ext uri="{FF2B5EF4-FFF2-40B4-BE49-F238E27FC236}">
+                <a16:creationId xmlns:a16="http://schemas.microsoft.com/office/drawing/2014/main" id="{29579BD7-A29A-4B50-9792-C30544F82E5F}"/>
+              </a:ext>
+            </a:extLst>
+          </p:cNvPr>
+          <p:cNvSpPr>
+            <a:spLocks noGrp="1"/>
+          </p:cNvSpPr>
+          <p:nvPr>
+            <p:ph type="sldNum" sz="quarter" idx="4"/>
+          </p:nvPr>
+        </p:nvSpPr>
+        <p:spPr/>
+        <p:txBody>
+          <a:bodyPr/>
+          <a:lstStyle/>
+          <a:p>
+            <a:fld id="{7A2122E2-2216-42E7-AB25-29B3EC69C4DB}" type="slidenum">
+              <a:rPr lang="en-US" smtClean="0">
+                <a:solidFill>
+                  <a:prstClr val="black">
+                    <a:tint val="75000"/>
+                  </a:prstClr>
+                </a:solidFill>
+              </a:rPr>
+              <a:pPr/>
+              <a:t>3</a:t>
+            </a:fld>
+            <a:endParaRPr lang="en-US">
+              <a:solidFill>
+                <a:prstClr val="black">
+                  <a:tint val="75000"/>
+                </a:prstClr>
+              </a:solidFill>
+            </a:endParaRPr>
+          </a:p>
+        </p:txBody>
+      </p:sp>
+      <p:sp>
+        <p:nvSpPr>
+          <p:cNvPr id="6" name="Date Placeholder 5">
+            <a:extLst>
+              <a:ext uri="{FF2B5EF4-FFF2-40B4-BE49-F238E27FC236}">
+                <a16:creationId xmlns:a16="http://schemas.microsoft.com/office/drawing/2014/main" id="{855EDC5F-5E8B-4A1A-A107-76945E93DAB3}"/>
+              </a:ext>
+            </a:extLst>
+          </p:cNvPr>
+          <p:cNvSpPr>
+            <a:spLocks noGrp="1"/>
+          </p:cNvSpPr>
+          <p:nvPr>
+            <p:ph type="dt" sz="half" idx="2"/>
+          </p:nvPr>
+        </p:nvSpPr>
+        <p:spPr/>
+        <p:txBody>
+          <a:bodyPr/>
+          <a:lstStyle/>
+          <a:p>
+            <a:fld id="{E2479D67-C2D0-4516-B70B-EB240258817A}" type="datetime1">
+              <a:rPr lang="en-US" smtClean="0"/>
+              <a:t>2/18/2023</a:t>
+            </a:fld>
+            <a:endParaRPr lang="en-US"/>
+          </a:p>
+        </p:txBody>
+      </p:sp>
+    </p:spTree>
+    <p:extLst>
+      <p:ext uri="{BB962C8B-B14F-4D97-AF65-F5344CB8AC3E}">
+        <p14:creationId xmlns:p14="http://schemas.microsoft.com/office/powerpoint/2010/main" val="4001520721"/>
+      </p:ext>
+    </p:extLst>
+  </p:cSld>
+  <p:clrMapOvr>
+    <a:masterClrMapping/>
+  </p:clrMapOvr>
+  <p:transition>
+    <p:fade thruBlk="1"/>
+  </p:transition>
+</p:sld>
+</file>
+
+<file path=ppt/slides/slide4.xml><?xml version="1.0" encoding="utf-8"?>
+<p:sld xmlns:a="http://schemas.openxmlformats.org/drawingml/2006/main" xmlns:r="http://schemas.openxmlformats.org/officeDocument/2006/relationships" xmlns:p="http://schemas.openxmlformats.org/presentationml/2006/main">
+  <p:cSld>
+    <p:spTree>
+      <p:nvGrpSpPr>
+        <p:cNvPr id="1" name=""/>
+        <p:cNvGrpSpPr/>
+        <p:nvPr/>
+      </p:nvGrpSpPr>
+      <p:grpSpPr>
+        <a:xfrm>
+          <a:off x="0" y="0"/>
+          <a:ext cx="0" cy="0"/>
+          <a:chOff x="0" y="0"/>
+          <a:chExt cx="0" cy="0"/>
+        </a:xfrm>
+      </p:grpSpPr>
+      <p:sp>
+        <p:nvSpPr>
+          <p:cNvPr id="2" name="Text Placeholder 1">
+            <a:extLst>
+              <a:ext uri="{FF2B5EF4-FFF2-40B4-BE49-F238E27FC236}">
+                <a16:creationId xmlns:a16="http://schemas.microsoft.com/office/drawing/2014/main" id="{A674C37A-3004-4323-A15B-215ECF4C5F86}"/>
+              </a:ext>
+            </a:extLst>
+          </p:cNvPr>
+          <p:cNvSpPr>
+            <a:spLocks noGrp="1"/>
+          </p:cNvSpPr>
+          <p:nvPr>
+            <p:ph type="body" sz="quarter" idx="10"/>
+          </p:nvPr>
+        </p:nvSpPr>
+        <p:spPr/>
+        <p:txBody>
+          <a:bodyPr/>
+          <a:lstStyle/>
+          <a:p>
+            <a:r>
+              <a:rPr lang="en-US" dirty="0"/>
+              <a:t>Visualization</a:t>
+            </a:r>
+          </a:p>
+        </p:txBody>
+      </p:sp>
+      <p:sp>
+        <p:nvSpPr>
+          <p:cNvPr id="3" name="Title 2">
+            <a:extLst>
+              <a:ext uri="{FF2B5EF4-FFF2-40B4-BE49-F238E27FC236}">
+                <a16:creationId xmlns:a16="http://schemas.microsoft.com/office/drawing/2014/main" id="{3CA30697-0A05-4204-9367-0131791CC3C5}"/>
+              </a:ext>
+            </a:extLst>
+          </p:cNvPr>
+          <p:cNvSpPr>
+            <a:spLocks noGrp="1"/>
+          </p:cNvSpPr>
+          <p:nvPr>
+            <p:ph type="title"/>
+          </p:nvPr>
+        </p:nvSpPr>
+        <p:spPr/>
+        <p:txBody>
+          <a:bodyPr/>
+          <a:lstStyle/>
+          <a:p>
+            <a:r>
+              <a:rPr lang="en-US" dirty="0"/>
+              <a:t>CS 6330 Final Project</a:t>
+            </a:r>
+          </a:p>
+        </p:txBody>
+      </p:sp>
+      <p:sp>
+        <p:nvSpPr>
+          <p:cNvPr id="4" name="Content Placeholder 3">
+            <a:extLst>
+              <a:ext uri="{FF2B5EF4-FFF2-40B4-BE49-F238E27FC236}">
+                <a16:creationId xmlns:a16="http://schemas.microsoft.com/office/drawing/2014/main" id="{34F16E64-213B-470D-9BEC-78E4B1A0B61D}"/>
+              </a:ext>
+            </a:extLst>
+          </p:cNvPr>
+          <p:cNvSpPr>
+            <a:spLocks noGrp="1"/>
+          </p:cNvSpPr>
+          <p:nvPr>
+            <p:ph idx="1"/>
+          </p:nvPr>
+        </p:nvSpPr>
+        <p:spPr/>
+        <p:txBody>
+          <a:bodyPr/>
+          <a:lstStyle/>
+          <a:p>
+            <a:r>
+              <a:rPr lang="en-US" dirty="0"/>
+              <a:t>Data Collection</a:t>
+            </a:r>
+          </a:p>
+          <a:p>
+            <a:pPr lvl="1"/>
+            <a:r>
+              <a:rPr lang="en-US" dirty="0"/>
+              <a:t>Three test subjects were outfitted with a 6 axis IMU, which recorded angular velocity and acceleration</a:t>
+            </a:r>
+          </a:p>
+          <a:p>
+            <a:pPr lvl="2"/>
+            <a:r>
+              <a:rPr lang="en-US" dirty="0"/>
+              <a:t>Data was collected at 500 </a:t>
+            </a:r>
+            <a:r>
+              <a:rPr lang="en-US" dirty="0" err="1"/>
+              <a:t>hz</a:t>
+            </a:r>
+            <a:r>
+              <a:rPr lang="en-US" dirty="0"/>
+              <a:t> and then down sampled to 100 </a:t>
+            </a:r>
+            <a:r>
+              <a:rPr lang="en-US" dirty="0" err="1"/>
+              <a:t>hz</a:t>
+            </a:r>
+            <a:endParaRPr lang="en-US" dirty="0"/>
+          </a:p>
+          <a:p>
+            <a:pPr lvl="2"/>
+            <a:r>
+              <a:rPr lang="en-US" dirty="0"/>
+              <a:t>The sensor was mounted at the hip</a:t>
+            </a:r>
+          </a:p>
+          <a:p>
+            <a:pPr lvl="2"/>
+            <a:endParaRPr lang="en-US" dirty="0"/>
+          </a:p>
+          <a:p>
+            <a:pPr lvl="1"/>
+            <a:r>
+              <a:rPr lang="en-US" dirty="0"/>
+              <a:t>The recorded activities included</a:t>
+            </a:r>
+          </a:p>
+          <a:p>
+            <a:pPr lvl="2"/>
+            <a:r>
+              <a:rPr lang="en-US" dirty="0"/>
+              <a:t>Walking at a measured pace</a:t>
+            </a:r>
+          </a:p>
+          <a:p>
+            <a:pPr lvl="2"/>
+            <a:r>
+              <a:rPr lang="en-US" dirty="0"/>
+              <a:t>Running </a:t>
+            </a:r>
+          </a:p>
+          <a:p>
+            <a:pPr lvl="2"/>
+            <a:r>
+              <a:rPr lang="en-US" dirty="0"/>
+              <a:t>Stair climbing/descending</a:t>
+            </a:r>
+          </a:p>
+          <a:p>
+            <a:pPr lvl="2"/>
+            <a:r>
+              <a:rPr lang="en-US" dirty="0"/>
+              <a:t>Treadmill</a:t>
+            </a:r>
+          </a:p>
+          <a:p>
+            <a:pPr lvl="2"/>
+            <a:r>
+              <a:rPr lang="en-US" dirty="0"/>
+              <a:t>Sitting</a:t>
+            </a:r>
+          </a:p>
+          <a:p>
+            <a:pPr lvl="2"/>
+            <a:r>
+              <a:rPr lang="en-US" dirty="0"/>
+              <a:t>Jumping</a:t>
+            </a:r>
+          </a:p>
+          <a:p>
+            <a:pPr lvl="2"/>
+            <a:r>
+              <a:rPr lang="en-US" dirty="0"/>
+              <a:t>Standing</a:t>
+            </a:r>
+          </a:p>
+          <a:p>
+            <a:pPr lvl="1"/>
+            <a:endParaRPr lang="en-US" dirty="0"/>
+          </a:p>
+        </p:txBody>
+      </p:sp>
+      <p:sp>
+        <p:nvSpPr>
+          <p:cNvPr id="5" name="Slide Number Placeholder 4">
+            <a:extLst>
+              <a:ext uri="{FF2B5EF4-FFF2-40B4-BE49-F238E27FC236}">
+                <a16:creationId xmlns:a16="http://schemas.microsoft.com/office/drawing/2014/main" id="{29579BD7-A29A-4B50-9792-C30544F82E5F}"/>
+              </a:ext>
+            </a:extLst>
+          </p:cNvPr>
+          <p:cNvSpPr>
+            <a:spLocks noGrp="1"/>
+          </p:cNvSpPr>
+          <p:nvPr>
+            <p:ph type="sldNum" sz="quarter" idx="4"/>
+          </p:nvPr>
+        </p:nvSpPr>
+        <p:spPr/>
+        <p:txBody>
+          <a:bodyPr/>
+          <a:lstStyle/>
+          <a:p>
+            <a:fld id="{7A2122E2-2216-42E7-AB25-29B3EC69C4DB}" type="slidenum">
+              <a:rPr lang="en-US" smtClean="0">
+                <a:solidFill>
+                  <a:prstClr val="black">
+                    <a:tint val="75000"/>
+                  </a:prstClr>
+                </a:solidFill>
+              </a:rPr>
+              <a:pPr/>
+              <a:t>4</a:t>
+            </a:fld>
+            <a:endParaRPr lang="en-US">
+              <a:solidFill>
+                <a:prstClr val="black">
+                  <a:tint val="75000"/>
+                </a:prstClr>
+              </a:solidFill>
+            </a:endParaRPr>
+          </a:p>
+        </p:txBody>
+      </p:sp>
+      <p:sp>
+        <p:nvSpPr>
+          <p:cNvPr id="6" name="Date Placeholder 5">
+            <a:extLst>
+              <a:ext uri="{FF2B5EF4-FFF2-40B4-BE49-F238E27FC236}">
+                <a16:creationId xmlns:a16="http://schemas.microsoft.com/office/drawing/2014/main" id="{855EDC5F-5E8B-4A1A-A107-76945E93DAB3}"/>
+              </a:ext>
+            </a:extLst>
+          </p:cNvPr>
+          <p:cNvSpPr>
+            <a:spLocks noGrp="1"/>
+          </p:cNvSpPr>
+          <p:nvPr>
+            <p:ph type="dt" sz="half" idx="2"/>
+          </p:nvPr>
+        </p:nvSpPr>
+        <p:spPr/>
+        <p:txBody>
+          <a:bodyPr/>
+          <a:lstStyle/>
+          <a:p>
+            <a:fld id="{E2479D67-C2D0-4516-B70B-EB240258817A}" type="datetime1">
+              <a:rPr lang="en-US" smtClean="0"/>
+              <a:t>2/18/2023</a:t>
+            </a:fld>
+            <a:endParaRPr lang="en-US"/>
+          </a:p>
+        </p:txBody>
+      </p:sp>
+    </p:spTree>
+    <p:extLst>
+      <p:ext uri="{BB962C8B-B14F-4D97-AF65-F5344CB8AC3E}">
+        <p14:creationId xmlns:p14="http://schemas.microsoft.com/office/powerpoint/2010/main" val="1439143035"/>
+      </p:ext>
+    </p:extLst>
+  </p:cSld>
+  <p:clrMapOvr>
+    <a:masterClrMapping/>
+  </p:clrMapOvr>
+  <p:transition>
+    <p:fade thruBlk="1"/>
+  </p:transition>
+</p:sld>
+</file>
+
+<file path=ppt/slides/slide5.xml><?xml version="1.0" encoding="utf-8"?>
+<p:sld xmlns:a="http://schemas.openxmlformats.org/drawingml/2006/main" xmlns:r="http://schemas.openxmlformats.org/officeDocument/2006/relationships" xmlns:p="http://schemas.openxmlformats.org/presentationml/2006/main">
+  <p:cSld>
+    <p:spTree>
+      <p:nvGrpSpPr>
+        <p:cNvPr id="1" name=""/>
+        <p:cNvGrpSpPr/>
+        <p:nvPr/>
+      </p:nvGrpSpPr>
+      <p:grpSpPr>
+        <a:xfrm>
+          <a:off x="0" y="0"/>
+          <a:ext cx="0" cy="0"/>
+          <a:chOff x="0" y="0"/>
+          <a:chExt cx="0" cy="0"/>
+        </a:xfrm>
+      </p:grpSpPr>
+      <p:sp>
+        <p:nvSpPr>
           <p:cNvPr id="33" name="Text Placeholder 32">
             <a:extLst>
               <a:ext uri="{FF2B5EF4-FFF2-40B4-BE49-F238E27FC236}">
@@ -18104,7 +18768,7 @@
                 </a:solidFill>
               </a:rPr>
               <a:pPr/>
-              <a:t>3</a:t>
+              <a:t>5</a:t>
             </a:fld>
             <a:endParaRPr lang="en-US">
               <a:solidFill>
@@ -18132,7 +18796,7 @@
 </p:sld>
 </file>
 
-<file path=ppt/slides/slide4.xml><?xml version="1.0" encoding="utf-8"?>
+<file path=ppt/slides/slide6.xml><?xml version="1.0" encoding="utf-8"?>
 <p:sld xmlns:a="http://schemas.openxmlformats.org/drawingml/2006/main" xmlns:r="http://schemas.openxmlformats.org/officeDocument/2006/relationships" xmlns:p="http://schemas.openxmlformats.org/presentationml/2006/main">
   <p:cSld>
     <p:spTree>
@@ -18268,7 +18932,7 @@
                 </a:solidFill>
               </a:rPr>
               <a:pPr/>
-              <a:t>4</a:t>
+              <a:t>6</a:t>
             </a:fld>
             <a:endParaRPr lang="en-US">
               <a:solidFill>
@@ -19327,21 +19991,6 @@
 </file>
 
 <file path=customXml/item1.xml><?xml version="1.0" encoding="utf-8"?>
-<p:properties xmlns:p="http://schemas.microsoft.com/office/2006/metadata/properties" xmlns:xsi="http://www.w3.org/2001/XMLSchema-instance" xmlns:pc="http://schemas.microsoft.com/office/infopath/2007/PartnerControls">
-  <documentManagement/>
-</p:properties>
-</file>
-
-<file path=customXml/item2.xml><?xml version="1.0" encoding="utf-8"?>
-<?mso-contentType ?>
-<FormTemplates xmlns="http://schemas.microsoft.com/sharepoint/v3/contenttype/forms">
-  <Display>DocumentLibraryForm</Display>
-  <Edit>DocumentLibraryForm</Edit>
-  <New>DocumentLibraryForm</New>
-</FormTemplates>
-</file>
-
-<file path=customXml/item3.xml><?xml version="1.0" encoding="utf-8"?>
 <ct:contentTypeSchema xmlns:ct="http://schemas.microsoft.com/office/2006/metadata/contentType" xmlns:ma="http://schemas.microsoft.com/office/2006/metadata/properties/metaAttributes" ct:_="" ma:_="" ma:contentTypeName="Document" ma:contentTypeID="0x010100B776AB20B58D654AA06DE8E33932FA8A" ma:contentTypeVersion="2" ma:contentTypeDescription="Create a new document." ma:contentTypeScope="" ma:versionID="40ef1952927d2e50fb179186e5a1a895">
   <xsd:schema xmlns:xsd="http://www.w3.org/2001/XMLSchema" xmlns:xs="http://www.w3.org/2001/XMLSchema" xmlns:p="http://schemas.microsoft.com/office/2006/metadata/properties" xmlns:ns2="beb76b56-07f3-441d-bfae-cb7ae3539b9d" targetNamespace="http://schemas.microsoft.com/office/2006/metadata/properties" ma:root="true" ma:fieldsID="0e0043146b5088936c70d76cc37ba713" ns2:_="">
     <xsd:import namespace="beb76b56-07f3-441d-bfae-cb7ae3539b9d"/>
@@ -19473,24 +20122,22 @@
 </ct:contentTypeSchema>
 </file>
 
-<file path=customXml/itemProps1.xml><?xml version="1.0" encoding="utf-8"?>
-<ds:datastoreItem xmlns:ds="http://schemas.openxmlformats.org/officeDocument/2006/customXml" ds:itemID="{E453CB54-D8AF-4CFA-8D2D-09818D604CC2}">
-  <ds:schemaRefs>
-    <ds:schemaRef ds:uri="http://schemas.microsoft.com/office/2006/metadata/properties"/>
-    <ds:schemaRef ds:uri="http://schemas.microsoft.com/office/infopath/2007/PartnerControls"/>
-  </ds:schemaRefs>
-</ds:datastoreItem>
+<file path=customXml/item2.xml><?xml version="1.0" encoding="utf-8"?>
+<?mso-contentType ?>
+<FormTemplates xmlns="http://schemas.microsoft.com/sharepoint/v3/contenttype/forms">
+  <Display>DocumentLibraryForm</Display>
+  <Edit>DocumentLibraryForm</Edit>
+  <New>DocumentLibraryForm</New>
+</FormTemplates>
 </file>
 
-<file path=customXml/itemProps2.xml><?xml version="1.0" encoding="utf-8"?>
-<ds:datastoreItem xmlns:ds="http://schemas.openxmlformats.org/officeDocument/2006/customXml" ds:itemID="{E5286A95-3188-45F8-919A-DAA81A28CF2F}">
-  <ds:schemaRefs>
-    <ds:schemaRef ds:uri="http://schemas.microsoft.com/sharepoint/v3/contenttype/forms"/>
-  </ds:schemaRefs>
-</ds:datastoreItem>
+<file path=customXml/item3.xml><?xml version="1.0" encoding="utf-8"?>
+<p:properties xmlns:p="http://schemas.microsoft.com/office/2006/metadata/properties" xmlns:xsi="http://www.w3.org/2001/XMLSchema-instance" xmlns:pc="http://schemas.microsoft.com/office/infopath/2007/PartnerControls">
+  <documentManagement/>
+</p:properties>
 </file>
 
-<file path=customXml/itemProps3.xml><?xml version="1.0" encoding="utf-8"?>
+<file path=customXml/itemProps1.xml><?xml version="1.0" encoding="utf-8"?>
 <ds:datastoreItem xmlns:ds="http://schemas.openxmlformats.org/officeDocument/2006/customXml" ds:itemID="{4F12F62A-D74B-4B8F-9761-767350F3BCE9}">
   <ds:schemaRefs>
     <ds:schemaRef ds:uri="http://schemas.microsoft.com/office/2006/metadata/contentType"/>
@@ -19506,4 +20153,21 @@
     <ds:schemaRef ds:uri="http://schemas.microsoft.com/internal/obd"/>
   </ds:schemaRefs>
 </ds:datastoreItem>
+</file>
+
+<file path=customXml/itemProps2.xml><?xml version="1.0" encoding="utf-8"?>
+<ds:datastoreItem xmlns:ds="http://schemas.openxmlformats.org/officeDocument/2006/customXml" ds:itemID="{E5286A95-3188-45F8-919A-DAA81A28CF2F}">
+  <ds:schemaRefs>
+    <ds:schemaRef ds:uri="http://schemas.microsoft.com/sharepoint/v3/contenttype/forms"/>
+  </ds:schemaRefs>
+</ds:datastoreItem>
+</file>
+
+<file path=customXml/itemProps3.xml><?xml version="1.0" encoding="utf-8"?>
+<ds:datastoreItem xmlns:ds="http://schemas.openxmlformats.org/officeDocument/2006/customXml" ds:itemID="{E453CB54-D8AF-4CFA-8D2D-09818D604CC2}">
+  <ds:schemaRefs>
+    <ds:schemaRef ds:uri="http://schemas.microsoft.com/office/2006/metadata/properties"/>
+    <ds:schemaRef ds:uri="http://schemas.microsoft.com/office/infopath/2007/PartnerControls"/>
+  </ds:schemaRefs>
+</ds:datastoreItem>
 </file>
</xml_diff>